<commit_message>
Update ppt and distributables to match
</commit_message>
<xml_diff>
--- a/Distributables/Nullability and Pattern Matching.pptx
+++ b/Distributables/Nullability and Pattern Matching.pptx
@@ -18,9 +18,9 @@
     <p:sldId id="257" r:id="rId9"/>
     <p:sldId id="261" r:id="rId10"/>
     <p:sldId id="262" r:id="rId11"/>
-    <p:sldId id="267" r:id="rId12"/>
-    <p:sldId id="265" r:id="rId13"/>
-    <p:sldId id="266" r:id="rId14"/>
+    <p:sldId id="272" r:id="rId12"/>
+    <p:sldId id="267" r:id="rId13"/>
+    <p:sldId id="265" r:id="rId14"/>
     <p:sldId id="268" r:id="rId15"/>
     <p:sldId id="269" r:id="rId16"/>
     <p:sldId id="271" r:id="rId17"/>
@@ -133,7 +133,7 @@
 <file path=ppt/revisionInfo.xml><?xml version="1.0" encoding="utf-8"?>
 <p1510:revInfo xmlns:a="http://schemas.openxmlformats.org/drawingml/2006/main" xmlns:r="http://schemas.openxmlformats.org/officeDocument/2006/relationships" xmlns:p1510="http://schemas.microsoft.com/office/powerpoint/2015/10/main">
   <p1510:revLst>
-    <p1510:client id="{975C3D32-749C-4479-9565-5D3005A6A40E}" v="10" dt="2021-04-09T17:08:48.352"/>
+    <p1510:client id="{975C3D32-749C-4479-9565-5D3005A6A40E}" v="12" dt="2021-04-09T19:39:16.853"/>
   </p1510:revLst>
 </p1510:revInfo>
 </file>
@@ -411,8 +411,8 @@
   </pc:docChgLst>
   <pc:docChgLst>
     <pc:chgData name="Benjamin Michaelis" userId="047d050af9d747a3" providerId="LiveId" clId="{975C3D32-749C-4479-9565-5D3005A6A40E}"/>
-    <pc:docChg chg="undo custSel modSld">
-      <pc:chgData name="Benjamin Michaelis" userId="047d050af9d747a3" providerId="LiveId" clId="{975C3D32-749C-4479-9565-5D3005A6A40E}" dt="2021-04-09T17:10:26.488" v="87" actId="115"/>
+    <pc:docChg chg="undo custSel addSld delSld modSld sldOrd">
+      <pc:chgData name="Benjamin Michaelis" userId="047d050af9d747a3" providerId="LiveId" clId="{975C3D32-749C-4479-9565-5D3005A6A40E}" dt="2021-04-09T19:43:11.995" v="760"/>
       <pc:docMkLst>
         <pc:docMk/>
       </pc:docMkLst>
@@ -470,6 +470,111 @@
             <ac:picMk id="11" creationId="{576379A3-017D-4DD6-A014-0E7ADD6D3211}"/>
           </ac:picMkLst>
         </pc:picChg>
+      </pc:sldChg>
+      <pc:sldChg chg="modSp mod">
+        <pc:chgData name="Benjamin Michaelis" userId="047d050af9d747a3" providerId="LiveId" clId="{975C3D32-749C-4479-9565-5D3005A6A40E}" dt="2021-04-09T19:24:51.976" v="196" actId="5793"/>
+        <pc:sldMkLst>
+          <pc:docMk/>
+          <pc:sldMk cId="1761299376" sldId="259"/>
+        </pc:sldMkLst>
+        <pc:spChg chg="mod">
+          <ac:chgData name="Benjamin Michaelis" userId="047d050af9d747a3" providerId="LiveId" clId="{975C3D32-749C-4479-9565-5D3005A6A40E}" dt="2021-04-09T19:24:51.976" v="196" actId="5793"/>
+          <ac:spMkLst>
+            <pc:docMk/>
+            <pc:sldMk cId="1761299376" sldId="259"/>
+            <ac:spMk id="3" creationId="{8D63D492-7BE7-4E60-B0C3-BD370D7C66BD}"/>
+          </ac:spMkLst>
+        </pc:spChg>
+      </pc:sldChg>
+      <pc:sldChg chg="modSp mod">
+        <pc:chgData name="Benjamin Michaelis" userId="047d050af9d747a3" providerId="LiveId" clId="{975C3D32-749C-4479-9565-5D3005A6A40E}" dt="2021-04-09T19:20:11.307" v="90" actId="20577"/>
+        <pc:sldMkLst>
+          <pc:docMk/>
+          <pc:sldMk cId="2953954537" sldId="260"/>
+        </pc:sldMkLst>
+        <pc:spChg chg="mod">
+          <ac:chgData name="Benjamin Michaelis" userId="047d050af9d747a3" providerId="LiveId" clId="{975C3D32-749C-4479-9565-5D3005A6A40E}" dt="2021-04-09T19:20:11.307" v="90" actId="20577"/>
+          <ac:spMkLst>
+            <pc:docMk/>
+            <pc:sldMk cId="2953954537" sldId="260"/>
+            <ac:spMk id="3" creationId="{B85D6BFC-0B1C-4DF5-918C-631E141B4ABC}"/>
+          </ac:spMkLst>
+        </pc:spChg>
+      </pc:sldChg>
+      <pc:sldChg chg="modSp mod">
+        <pc:chgData name="Benjamin Michaelis" userId="047d050af9d747a3" providerId="LiveId" clId="{975C3D32-749C-4479-9565-5D3005A6A40E}" dt="2021-04-09T19:40:45.736" v="713" actId="5793"/>
+        <pc:sldMkLst>
+          <pc:docMk/>
+          <pc:sldMk cId="2901066272" sldId="265"/>
+        </pc:sldMkLst>
+        <pc:spChg chg="mod">
+          <ac:chgData name="Benjamin Michaelis" userId="047d050af9d747a3" providerId="LiveId" clId="{975C3D32-749C-4479-9565-5D3005A6A40E}" dt="2021-04-09T19:40:45.736" v="713" actId="5793"/>
+          <ac:spMkLst>
+            <pc:docMk/>
+            <pc:sldMk cId="2901066272" sldId="265"/>
+            <ac:spMk id="3" creationId="{37A151B1-D43B-4DEB-95F4-5213D7FD14E7}"/>
+          </ac:spMkLst>
+        </pc:spChg>
+      </pc:sldChg>
+      <pc:sldChg chg="modSp del mod">
+        <pc:chgData name="Benjamin Michaelis" userId="047d050af9d747a3" providerId="LiveId" clId="{975C3D32-749C-4479-9565-5D3005A6A40E}" dt="2021-04-09T19:40:50.010" v="714" actId="2696"/>
+        <pc:sldMkLst>
+          <pc:docMk/>
+          <pc:sldMk cId="2191981442" sldId="266"/>
+        </pc:sldMkLst>
+        <pc:spChg chg="mod">
+          <ac:chgData name="Benjamin Michaelis" userId="047d050af9d747a3" providerId="LiveId" clId="{975C3D32-749C-4479-9565-5D3005A6A40E}" dt="2021-04-09T19:39:54.249" v="592" actId="21"/>
+          <ac:spMkLst>
+            <pc:docMk/>
+            <pc:sldMk cId="2191981442" sldId="266"/>
+            <ac:spMk id="3" creationId="{37A151B1-D43B-4DEB-95F4-5213D7FD14E7}"/>
+          </ac:spMkLst>
+        </pc:spChg>
+      </pc:sldChg>
+      <pc:sldChg chg="modSp mod">
+        <pc:chgData name="Benjamin Michaelis" userId="047d050af9d747a3" providerId="LiveId" clId="{975C3D32-749C-4479-9565-5D3005A6A40E}" dt="2021-04-09T19:39:27.545" v="591" actId="20577"/>
+        <pc:sldMkLst>
+          <pc:docMk/>
+          <pc:sldMk cId="1197133609" sldId="267"/>
+        </pc:sldMkLst>
+        <pc:spChg chg="mod">
+          <ac:chgData name="Benjamin Michaelis" userId="047d050af9d747a3" providerId="LiveId" clId="{975C3D32-749C-4479-9565-5D3005A6A40E}" dt="2021-04-09T19:39:27.545" v="591" actId="20577"/>
+          <ac:spMkLst>
+            <pc:docMk/>
+            <pc:sldMk cId="1197133609" sldId="267"/>
+            <ac:spMk id="3" creationId="{37A151B1-D43B-4DEB-95F4-5213D7FD14E7}"/>
+          </ac:spMkLst>
+        </pc:spChg>
+      </pc:sldChg>
+      <pc:sldChg chg="modSp mod">
+        <pc:chgData name="Benjamin Michaelis" userId="047d050af9d747a3" providerId="LiveId" clId="{975C3D32-749C-4479-9565-5D3005A6A40E}" dt="2021-04-09T19:43:11.995" v="760"/>
+        <pc:sldMkLst>
+          <pc:docMk/>
+          <pc:sldMk cId="4264799517" sldId="271"/>
+        </pc:sldMkLst>
+        <pc:spChg chg="mod">
+          <ac:chgData name="Benjamin Michaelis" userId="047d050af9d747a3" providerId="LiveId" clId="{975C3D32-749C-4479-9565-5D3005A6A40E}" dt="2021-04-09T19:43:11.995" v="760"/>
+          <ac:spMkLst>
+            <pc:docMk/>
+            <pc:sldMk cId="4264799517" sldId="271"/>
+            <ac:spMk id="3" creationId="{ACF7E753-FFEF-4B9C-A747-6F3BA99C99F2}"/>
+          </ac:spMkLst>
+        </pc:spChg>
+      </pc:sldChg>
+      <pc:sldChg chg="modSp add mod ord">
+        <pc:chgData name="Benjamin Michaelis" userId="047d050af9d747a3" providerId="LiveId" clId="{975C3D32-749C-4479-9565-5D3005A6A40E}" dt="2021-04-09T19:41:53.745" v="744" actId="20577"/>
+        <pc:sldMkLst>
+          <pc:docMk/>
+          <pc:sldMk cId="775100608" sldId="272"/>
+        </pc:sldMkLst>
+        <pc:spChg chg="mod">
+          <ac:chgData name="Benjamin Michaelis" userId="047d050af9d747a3" providerId="LiveId" clId="{975C3D32-749C-4479-9565-5D3005A6A40E}" dt="2021-04-09T19:41:53.745" v="744" actId="20577"/>
+          <ac:spMkLst>
+            <pc:docMk/>
+            <pc:sldMk cId="775100608" sldId="272"/>
+            <ac:spMk id="3" creationId="{37A151B1-D43B-4DEB-95F4-5213D7FD14E7}"/>
+          </ac:spMkLst>
+        </pc:spChg>
       </pc:sldChg>
     </pc:docChg>
   </pc:docChgLst>
@@ -6574,191 +6679,449 @@
         <p:spPr/>
         <p:txBody>
           <a:bodyPr>
-            <a:normAutofit/>
+            <a:normAutofit fontScale="92500"/>
           </a:bodyPr>
           <a:lstStyle/>
           <a:p>
             <a:r>
               <a:rPr lang="en-US" b="0" dirty="0">
-                <a:solidFill>
-                  <a:srgbClr val="569CD6"/>
-                </a:solidFill>
-                <a:effectLst/>
-                <a:latin typeface="Consolas" panose="020B0609020204030204" pitchFamily="49" charset="0"/>
-              </a:rPr>
-              <a:t>private</a:t>
-            </a:r>
-            <a:r>
-              <a:rPr lang="en-US" b="0" dirty="0">
-                <a:solidFill>
-                  <a:srgbClr val="CCCCCC"/>
-                </a:solidFill>
-                <a:effectLst/>
-                <a:latin typeface="Consolas" panose="020B0609020204030204" pitchFamily="49" charset="0"/>
+                <a:effectLst/>
+              </a:rPr>
+              <a:t>Patterns test that a value has a certain type, and can extract information from the value when it has the matching type. Pattern matching provides more concise syntax for algorithms. </a:t>
+            </a:r>
+            <a:endParaRPr lang="en-US" sz="1800" dirty="0"/>
+          </a:p>
+          <a:p>
+            <a:pPr marL="0" indent="0">
+              <a:lnSpc>
+                <a:spcPts val="1320"/>
+              </a:lnSpc>
+              <a:buNone/>
+            </a:pPr>
+            <a:r>
+              <a:rPr lang="en-US" b="0" i="0" dirty="0">
+                <a:solidFill>
+                  <a:srgbClr val="0101FD"/>
+                </a:solidFill>
+                <a:effectLst/>
+                <a:latin typeface="SFMono-Regular"/>
+              </a:rPr>
+              <a:t>if</a:t>
+            </a:r>
+            <a:r>
+              <a:rPr lang="en-US" b="0" i="0" dirty="0">
+                <a:solidFill>
+                  <a:srgbClr val="171717"/>
+                </a:solidFill>
+                <a:effectLst/>
+                <a:latin typeface="SFMono-Regular"/>
+              </a:rPr>
+              <a:t> (shape </a:t>
+            </a:r>
+            <a:r>
+              <a:rPr lang="en-US" b="0" i="0" dirty="0">
+                <a:solidFill>
+                  <a:srgbClr val="0101FD"/>
+                </a:solidFill>
+                <a:effectLst/>
+                <a:latin typeface="SFMono-Regular"/>
+              </a:rPr>
+              <a:t>is</a:t>
+            </a:r>
+            <a:r>
+              <a:rPr lang="en-US" b="0" i="0" dirty="0">
+                <a:solidFill>
+                  <a:srgbClr val="171717"/>
+                </a:solidFill>
+                <a:effectLst/>
+                <a:latin typeface="SFMono-Regular"/>
+              </a:rPr>
+              <a:t> Square)</a:t>
+            </a:r>
+          </a:p>
+          <a:p>
+            <a:pPr marL="0" indent="0">
+              <a:lnSpc>
+                <a:spcPts val="1320"/>
+              </a:lnSpc>
+              <a:buNone/>
+            </a:pPr>
+            <a:r>
+              <a:rPr lang="en-US" b="0" i="0" dirty="0">
+                <a:solidFill>
+                  <a:srgbClr val="171717"/>
+                </a:solidFill>
+                <a:effectLst/>
+                <a:latin typeface="SFMono-Regular"/>
+              </a:rPr>
+              <a:t>{</a:t>
+            </a:r>
+          </a:p>
+          <a:p>
+            <a:pPr marL="0" indent="0">
+              <a:lnSpc>
+                <a:spcPts val="1320"/>
+              </a:lnSpc>
+              <a:buNone/>
+            </a:pPr>
+            <a:r>
+              <a:rPr lang="en-US" b="0" i="0" dirty="0">
+                <a:solidFill>
+                  <a:srgbClr val="0101FD"/>
+                </a:solidFill>
+                <a:effectLst/>
+                <a:latin typeface="SFMono-Regular"/>
+              </a:rPr>
+              <a:t>var</a:t>
+            </a:r>
+            <a:r>
+              <a:rPr lang="en-US" b="0" i="0" dirty="0">
+                <a:solidFill>
+                  <a:srgbClr val="171717"/>
+                </a:solidFill>
+                <a:effectLst/>
+                <a:latin typeface="SFMono-Regular"/>
+              </a:rPr>
+              <a:t> s = (Square)shape;</a:t>
+            </a:r>
+          </a:p>
+          <a:p>
+            <a:pPr marL="0" indent="0">
+              <a:lnSpc>
+                <a:spcPts val="1320"/>
+              </a:lnSpc>
+              <a:buNone/>
+            </a:pPr>
+            <a:r>
+              <a:rPr lang="en-US" b="0" i="0" dirty="0">
+                <a:solidFill>
+                  <a:srgbClr val="0101FD"/>
+                </a:solidFill>
+                <a:effectLst/>
+                <a:latin typeface="SFMono-Regular"/>
+              </a:rPr>
+              <a:t>return</a:t>
+            </a:r>
+            <a:r>
+              <a:rPr lang="en-US" b="0" i="0" dirty="0">
+                <a:solidFill>
+                  <a:srgbClr val="171717"/>
+                </a:solidFill>
+                <a:effectLst/>
+                <a:latin typeface="SFMono-Regular"/>
               </a:rPr>
               <a:t> </a:t>
             </a:r>
             <a:r>
-              <a:rPr lang="en-US" b="0" dirty="0" err="1">
-                <a:effectLst/>
-                <a:latin typeface="Consolas" panose="020B0609020204030204" pitchFamily="49" charset="0"/>
-              </a:rPr>
-              <a:t>IEnumerable</a:t>
-            </a:r>
-            <a:r>
-              <a:rPr lang="en-US" b="0" dirty="0">
-                <a:effectLst/>
-                <a:latin typeface="Consolas" panose="020B0609020204030204" pitchFamily="49" charset="0"/>
-              </a:rPr>
-              <a:t>&lt;Shape&gt; Shapes</a:t>
+              <a:rPr lang="en-US" b="0" i="0" dirty="0" err="1">
+                <a:solidFill>
+                  <a:srgbClr val="171717"/>
+                </a:solidFill>
+                <a:effectLst/>
+                <a:latin typeface="SFMono-Regular"/>
+              </a:rPr>
+              <a:t>s.Side</a:t>
+            </a:r>
+            <a:r>
+              <a:rPr lang="en-US" b="0" i="0" dirty="0">
+                <a:solidFill>
+                  <a:srgbClr val="171717"/>
+                </a:solidFill>
+                <a:effectLst/>
+                <a:latin typeface="SFMono-Regular"/>
+              </a:rPr>
+              <a:t> * </a:t>
+            </a:r>
+            <a:r>
+              <a:rPr lang="en-US" b="0" i="0" dirty="0" err="1">
+                <a:solidFill>
+                  <a:srgbClr val="171717"/>
+                </a:solidFill>
+                <a:effectLst/>
+                <a:latin typeface="SFMono-Regular"/>
+              </a:rPr>
+              <a:t>s.Side</a:t>
+            </a:r>
+            <a:r>
+              <a:rPr lang="en-US" b="0" i="0" dirty="0">
+                <a:solidFill>
+                  <a:srgbClr val="171717"/>
+                </a:solidFill>
+                <a:effectLst/>
+                <a:latin typeface="SFMono-Regular"/>
+              </a:rPr>
+              <a:t>;</a:t>
             </a:r>
           </a:p>
           <a:p>
             <a:pPr marL="0" indent="0">
+              <a:lnSpc>
+                <a:spcPts val="1320"/>
+              </a:lnSpc>
               <a:buNone/>
             </a:pPr>
             <a:r>
-              <a:rPr lang="en-US" b="0" dirty="0">
-                <a:effectLst/>
-                <a:latin typeface="Consolas" panose="020B0609020204030204" pitchFamily="49" charset="0"/>
+              <a:rPr lang="en-US" b="0" i="0" dirty="0">
+                <a:solidFill>
+                  <a:srgbClr val="171717"/>
+                </a:solidFill>
+                <a:effectLst/>
+                <a:latin typeface="SFMono-Regular"/>
+              </a:rPr>
+              <a:t>}</a:t>
+            </a:r>
+          </a:p>
+          <a:p>
+            <a:pPr marL="0" indent="0">
+              <a:lnSpc>
+                <a:spcPts val="1320"/>
+              </a:lnSpc>
+              <a:buNone/>
+            </a:pPr>
+            <a:r>
+              <a:rPr lang="en-US" b="0" i="0" dirty="0">
+                <a:solidFill>
+                  <a:srgbClr val="0101FD"/>
+                </a:solidFill>
+                <a:effectLst/>
+                <a:latin typeface="SFMono-Regular"/>
+              </a:rPr>
+              <a:t>else</a:t>
+            </a:r>
+            <a:r>
+              <a:rPr lang="en-US" b="0" i="0" dirty="0">
+                <a:solidFill>
+                  <a:srgbClr val="171717"/>
+                </a:solidFill>
+                <a:effectLst/>
+                <a:latin typeface="SFMono-Regular"/>
+              </a:rPr>
+              <a:t> </a:t>
+            </a:r>
+            <a:r>
+              <a:rPr lang="en-US" b="0" i="0" dirty="0">
+                <a:solidFill>
+                  <a:srgbClr val="0101FD"/>
+                </a:solidFill>
+                <a:effectLst/>
+                <a:latin typeface="SFMono-Regular"/>
+              </a:rPr>
+              <a:t>if</a:t>
+            </a:r>
+            <a:r>
+              <a:rPr lang="en-US" b="0" i="0" dirty="0">
+                <a:solidFill>
+                  <a:srgbClr val="171717"/>
+                </a:solidFill>
+                <a:effectLst/>
+                <a:latin typeface="SFMono-Regular"/>
+              </a:rPr>
+              <a:t> (shape </a:t>
+            </a:r>
+            <a:r>
+              <a:rPr lang="en-US" b="0" i="0" dirty="0">
+                <a:solidFill>
+                  <a:srgbClr val="0101FD"/>
+                </a:solidFill>
+                <a:effectLst/>
+                <a:latin typeface="SFMono-Regular"/>
+              </a:rPr>
+              <a:t>is</a:t>
+            </a:r>
+            <a:r>
+              <a:rPr lang="en-US" b="0" i="0" dirty="0">
+                <a:solidFill>
+                  <a:srgbClr val="171717"/>
+                </a:solidFill>
+                <a:effectLst/>
+                <a:latin typeface="SFMono-Regular"/>
+              </a:rPr>
+              <a:t> Circle)</a:t>
+            </a:r>
+          </a:p>
+          <a:p>
+            <a:pPr marL="0" indent="0">
+              <a:lnSpc>
+                <a:spcPts val="1320"/>
+              </a:lnSpc>
+              <a:buNone/>
+            </a:pPr>
+            <a:r>
+              <a:rPr lang="en-US" b="0" i="0" dirty="0">
+                <a:solidFill>
+                  <a:srgbClr val="171717"/>
+                </a:solidFill>
+                <a:effectLst/>
+                <a:latin typeface="SFMono-Regular"/>
               </a:rPr>
               <a:t>{</a:t>
             </a:r>
           </a:p>
           <a:p>
-            <a:pPr marL="274320" lvl="1" indent="0">
+            <a:pPr marL="0" indent="0">
+              <a:lnSpc>
+                <a:spcPts val="1320"/>
+              </a:lnSpc>
               <a:buNone/>
             </a:pPr>
             <a:r>
-              <a:rPr lang="en-US" b="0" dirty="0">
-                <a:solidFill>
-                  <a:srgbClr val="569CD6"/>
-                </a:solidFill>
-                <a:effectLst/>
-                <a:latin typeface="Consolas" panose="020B0609020204030204" pitchFamily="49" charset="0"/>
-              </a:rPr>
-              <a:t>get</a:t>
+              <a:rPr lang="en-US" b="0" i="0" dirty="0">
+                <a:solidFill>
+                  <a:srgbClr val="0101FD"/>
+                </a:solidFill>
+                <a:effectLst/>
+                <a:latin typeface="SFMono-Regular"/>
+              </a:rPr>
+              <a:t>var</a:t>
+            </a:r>
+            <a:r>
+              <a:rPr lang="en-US" b="0" i="0" dirty="0">
+                <a:solidFill>
+                  <a:srgbClr val="171717"/>
+                </a:solidFill>
+                <a:effectLst/>
+                <a:latin typeface="SFMono-Regular"/>
+              </a:rPr>
+              <a:t> c = (Circle)shape;</a:t>
+            </a:r>
+          </a:p>
+          <a:p>
+            <a:pPr marL="0" indent="0">
+              <a:lnSpc>
+                <a:spcPts val="1320"/>
+              </a:lnSpc>
+              <a:buNone/>
+            </a:pPr>
+            <a:r>
+              <a:rPr lang="en-US" b="0" i="0" dirty="0">
+                <a:solidFill>
+                  <a:srgbClr val="0101FD"/>
+                </a:solidFill>
+                <a:effectLst/>
+                <a:latin typeface="SFMono-Regular"/>
+              </a:rPr>
+              <a:t>return</a:t>
+            </a:r>
+            <a:r>
+              <a:rPr lang="en-US" b="0" i="0" dirty="0">
+                <a:solidFill>
+                  <a:srgbClr val="171717"/>
+                </a:solidFill>
+                <a:effectLst/>
+                <a:latin typeface="SFMono-Regular"/>
+              </a:rPr>
+              <a:t> </a:t>
+            </a:r>
+            <a:r>
+              <a:rPr lang="en-US" b="0" i="0" dirty="0" err="1">
+                <a:solidFill>
+                  <a:srgbClr val="171717"/>
+                </a:solidFill>
+                <a:effectLst/>
+                <a:latin typeface="SFMono-Regular"/>
+              </a:rPr>
+              <a:t>c.Radius</a:t>
+            </a:r>
+            <a:r>
+              <a:rPr lang="en-US" b="0" i="0" dirty="0">
+                <a:solidFill>
+                  <a:srgbClr val="171717"/>
+                </a:solidFill>
+                <a:effectLst/>
+                <a:latin typeface="SFMono-Regular"/>
+              </a:rPr>
+              <a:t> * </a:t>
+            </a:r>
+            <a:r>
+              <a:rPr lang="en-US" b="0" i="0" dirty="0" err="1">
+                <a:solidFill>
+                  <a:srgbClr val="171717"/>
+                </a:solidFill>
+                <a:effectLst/>
+                <a:latin typeface="SFMono-Regular"/>
+              </a:rPr>
+              <a:t>c.Radius</a:t>
+            </a:r>
+            <a:r>
+              <a:rPr lang="en-US" b="0" i="0" dirty="0">
+                <a:solidFill>
+                  <a:srgbClr val="171717"/>
+                </a:solidFill>
+                <a:effectLst/>
+                <a:latin typeface="SFMono-Regular"/>
+              </a:rPr>
+              <a:t> * </a:t>
+            </a:r>
+            <a:r>
+              <a:rPr lang="en-US" b="0" i="0" dirty="0" err="1">
+                <a:solidFill>
+                  <a:srgbClr val="171717"/>
+                </a:solidFill>
+                <a:effectLst/>
+                <a:latin typeface="SFMono-Regular"/>
+              </a:rPr>
+              <a:t>Math.PI</a:t>
+            </a:r>
+            <a:r>
+              <a:rPr lang="en-US" b="0" i="0" dirty="0">
+                <a:solidFill>
+                  <a:srgbClr val="171717"/>
+                </a:solidFill>
+                <a:effectLst/>
+                <a:latin typeface="SFMono-Regular"/>
+              </a:rPr>
+              <a:t>;</a:t>
+            </a:r>
+          </a:p>
+          <a:p>
+            <a:pPr marL="0" indent="0">
+              <a:lnSpc>
+                <a:spcPts val="1320"/>
+              </a:lnSpc>
+              <a:buNone/>
+            </a:pPr>
+            <a:r>
+              <a:rPr lang="en-US" dirty="0">
+                <a:solidFill>
+                  <a:srgbClr val="171717"/>
+                </a:solidFill>
+                <a:latin typeface="SFMono-Regular"/>
+              </a:rPr>
+              <a:t>}</a:t>
+            </a:r>
+            <a:endParaRPr lang="en-US" sz="1800" dirty="0">
+              <a:solidFill>
+                <a:srgbClr val="171717"/>
+              </a:solidFill>
+              <a:latin typeface="Segoe UI" panose="020B0502040204020203" pitchFamily="34" charset="0"/>
+            </a:endParaRPr>
+          </a:p>
+          <a:p>
+            <a:r>
+              <a:rPr lang="en-US" sz="1800" dirty="0"/>
+              <a:t>MSDN Documentation on pattern matc</a:t>
+            </a:r>
+            <a:r>
+              <a:rPr lang="en-US" dirty="0"/>
+              <a:t>hing: </a:t>
+            </a:r>
+            <a:r>
+              <a:rPr lang="en-US" dirty="0">
+                <a:hlinkClick r:id="rId2"/>
+              </a:rPr>
+              <a:t>https://docs.microsoft.com/en-us/dotnet/csharp/pattern-matching</a:t>
             </a:r>
             <a:endParaRPr lang="en-US" b="0" dirty="0">
-              <a:solidFill>
-                <a:srgbClr val="CCCCCC"/>
-              </a:solidFill>
               <a:effectLst/>
               <a:latin typeface="Consolas" panose="020B0609020204030204" pitchFamily="49" charset="0"/>
             </a:endParaRPr>
           </a:p>
-          <a:p>
-            <a:pPr marL="274320" lvl="1" indent="0">
-              <a:buNone/>
-            </a:pPr>
-            <a:r>
-              <a:rPr lang="en-US" b="0" dirty="0">
-                <a:effectLst/>
-                <a:latin typeface="Consolas" panose="020B0609020204030204" pitchFamily="49" charset="0"/>
-              </a:rPr>
-              <a:t>{</a:t>
-            </a:r>
-          </a:p>
-          <a:p>
-            <a:pPr marL="274320" lvl="1" indent="0">
-              <a:buNone/>
-            </a:pPr>
-            <a:r>
-              <a:rPr lang="en-US" b="0" dirty="0">
-                <a:solidFill>
-                  <a:srgbClr val="569CD6"/>
-                </a:solidFill>
-                <a:effectLst/>
-                <a:latin typeface="Consolas" panose="020B0609020204030204" pitchFamily="49" charset="0"/>
-              </a:rPr>
-              <a:t>	return</a:t>
-            </a:r>
-            <a:r>
-              <a:rPr lang="en-US" b="0" dirty="0">
-                <a:solidFill>
-                  <a:srgbClr val="CCCCCC"/>
-                </a:solidFill>
-                <a:effectLst/>
-                <a:latin typeface="Consolas" panose="020B0609020204030204" pitchFamily="49" charset="0"/>
-              </a:rPr>
-              <a:t> </a:t>
-            </a:r>
-            <a:r>
-              <a:rPr lang="en-US" b="0" dirty="0">
-                <a:solidFill>
-                  <a:srgbClr val="569CD6"/>
-                </a:solidFill>
-                <a:effectLst/>
-                <a:latin typeface="Consolas" panose="020B0609020204030204" pitchFamily="49" charset="0"/>
-              </a:rPr>
-              <a:t>this</a:t>
-            </a:r>
-            <a:r>
-              <a:rPr lang="en-US" b="0" dirty="0">
-                <a:effectLst/>
-                <a:latin typeface="Consolas" panose="020B0609020204030204" pitchFamily="49" charset="0"/>
-              </a:rPr>
-              <a:t>._</a:t>
-            </a:r>
-            <a:r>
-              <a:rPr lang="en-US" b="0" dirty="0" err="1">
-                <a:effectLst/>
-                <a:latin typeface="Consolas" panose="020B0609020204030204" pitchFamily="49" charset="0"/>
-              </a:rPr>
-              <a:t>sequences.SelectMany</a:t>
-            </a:r>
-            <a:r>
-              <a:rPr lang="en-US" b="0" dirty="0">
-                <a:effectLst/>
-                <a:latin typeface="Consolas" panose="020B0609020204030204" pitchFamily="49" charset="0"/>
-              </a:rPr>
-              <a:t>(item =&gt; item).</a:t>
-            </a:r>
-            <a:r>
-              <a:rPr lang="en-US" b="0" dirty="0" err="1">
-                <a:effectLst/>
-                <a:latin typeface="Consolas" panose="020B0609020204030204" pitchFamily="49" charset="0"/>
-              </a:rPr>
-              <a:t>ToList</a:t>
-            </a:r>
-            <a:r>
-              <a:rPr lang="en-US" b="0" dirty="0">
-                <a:effectLst/>
-                <a:latin typeface="Consolas" panose="020B0609020204030204" pitchFamily="49" charset="0"/>
-              </a:rPr>
-              <a:t>();</a:t>
-            </a:r>
-          </a:p>
-          <a:p>
-            <a:pPr marL="274320" lvl="1" indent="0">
-              <a:buNone/>
-            </a:pPr>
-            <a:r>
-              <a:rPr lang="en-US" b="0" dirty="0">
-                <a:effectLst/>
-                <a:latin typeface="Consolas" panose="020B0609020204030204" pitchFamily="49" charset="0"/>
-              </a:rPr>
-              <a:t>}</a:t>
-            </a:r>
-          </a:p>
-          <a:p>
-            <a:pPr marL="0" indent="0">
-              <a:buNone/>
-            </a:pPr>
-            <a:r>
-              <a:rPr lang="en-US" b="0" dirty="0">
-                <a:effectLst/>
-                <a:latin typeface="Consolas" panose="020B0609020204030204" pitchFamily="49" charset="0"/>
-              </a:rPr>
-              <a:t>}</a:t>
-            </a:r>
-          </a:p>
         </p:txBody>
       </p:sp>
     </p:spTree>
     <p:extLst>
       <p:ext uri="{BB962C8B-B14F-4D97-AF65-F5344CB8AC3E}">
-        <p14:creationId xmlns:p14="http://schemas.microsoft.com/office/powerpoint/2010/main" val="1197133609"/>
+        <p14:creationId xmlns:p14="http://schemas.microsoft.com/office/powerpoint/2010/main" val="775100608"/>
       </p:ext>
     </p:extLst>
   </p:cSld>
@@ -6837,6 +7200,36 @@
           <a:lstStyle/>
           <a:p>
             <a:r>
+              <a:rPr lang="en-US" sz="1800" kern="1200" dirty="0">
+                <a:solidFill>
+                  <a:srgbClr val="000000"/>
+                </a:solidFill>
+                <a:effectLst/>
+                <a:latin typeface="Garamond" panose="02020404030301010803" pitchFamily="18" charset="0"/>
+                <a:ea typeface="+mn-ea"/>
+                <a:cs typeface="+mn-cs"/>
+              </a:rPr>
+              <a:t>Here we can use a reference word, in this case “item” to refer to an object that we want to select or perform operations on with </a:t>
+            </a:r>
+            <a:r>
+              <a:rPr lang="en-US" sz="1800" kern="1200" dirty="0" err="1">
+                <a:solidFill>
+                  <a:srgbClr val="000000"/>
+                </a:solidFill>
+                <a:effectLst/>
+                <a:latin typeface="Garamond" panose="02020404030301010803" pitchFamily="18" charset="0"/>
+                <a:ea typeface="+mn-ea"/>
+                <a:cs typeface="+mn-cs"/>
+              </a:rPr>
+              <a:t>Enumerables</a:t>
+            </a:r>
+            <a:endParaRPr lang="en-US" dirty="0"/>
+          </a:p>
+          <a:p>
+            <a:pPr marL="0" indent="0">
+              <a:buNone/>
+            </a:pPr>
+            <a:r>
               <a:rPr lang="en-US" b="0" dirty="0">
                 <a:solidFill>
                   <a:srgbClr val="569CD6"/>
@@ -6857,17 +7250,82 @@
               <a:t> </a:t>
             </a:r>
             <a:r>
+              <a:rPr lang="en-US" b="0" dirty="0" err="1">
+                <a:effectLst/>
+                <a:latin typeface="Consolas" panose="020B0609020204030204" pitchFamily="49" charset="0"/>
+              </a:rPr>
+              <a:t>IEnumerable</a:t>
+            </a:r>
+            <a:r>
               <a:rPr lang="en-US" b="0" dirty="0">
+                <a:effectLst/>
+                <a:latin typeface="Consolas" panose="020B0609020204030204" pitchFamily="49" charset="0"/>
+              </a:rPr>
+              <a:t>&lt;Shape&gt; Shapes</a:t>
+            </a:r>
+          </a:p>
+          <a:p>
+            <a:pPr marL="0" indent="0">
+              <a:buNone/>
+            </a:pPr>
+            <a:r>
+              <a:rPr lang="en-US" b="0" dirty="0">
+                <a:effectLst/>
+                <a:latin typeface="Consolas" panose="020B0609020204030204" pitchFamily="49" charset="0"/>
+              </a:rPr>
+              <a:t>{</a:t>
+            </a:r>
+          </a:p>
+          <a:p>
+            <a:pPr marL="274320" lvl="1" indent="0">
+              <a:buNone/>
+            </a:pPr>
+            <a:r>
+              <a:rPr lang="en-US" b="0" dirty="0">
                 <a:solidFill>
                   <a:srgbClr val="569CD6"/>
                 </a:solidFill>
                 <a:effectLst/>
                 <a:latin typeface="Consolas" panose="020B0609020204030204" pitchFamily="49" charset="0"/>
               </a:rPr>
-              <a:t>static</a:t>
-            </a:r>
+              <a:t>get</a:t>
+            </a:r>
+            <a:endParaRPr lang="en-US" b="0" dirty="0">
+              <a:solidFill>
+                <a:srgbClr val="CCCCCC"/>
+              </a:solidFill>
+              <a:effectLst/>
+              <a:latin typeface="Consolas" panose="020B0609020204030204" pitchFamily="49" charset="0"/>
+            </a:endParaRPr>
+          </a:p>
+          <a:p>
+            <a:pPr marL="274320" lvl="1" indent="0">
+              <a:buNone/>
+            </a:pPr>
             <a:r>
               <a:rPr lang="en-US" b="0" dirty="0">
+                <a:effectLst/>
+                <a:latin typeface="Consolas" panose="020B0609020204030204" pitchFamily="49" charset="0"/>
+              </a:rPr>
+              <a:t>{</a:t>
+            </a:r>
+          </a:p>
+          <a:p>
+            <a:pPr marL="274320" lvl="1" indent="0">
+              <a:buNone/>
+            </a:pPr>
+            <a:r>
+              <a:rPr lang="en-US" b="0" dirty="0">
+                <a:solidFill>
+                  <a:srgbClr val="569CD6"/>
+                </a:solidFill>
+                <a:effectLst/>
+                <a:latin typeface="Consolas" panose="020B0609020204030204" pitchFamily="49" charset="0"/>
+              </a:rPr>
+              <a:t>	return</a:t>
+            </a:r>
+            <a:r>
+              <a:rPr lang="en-US" b="0" dirty="0">
                 <a:solidFill>
                   <a:srgbClr val="CCCCCC"/>
                 </a:solidFill>
@@ -6877,113 +7335,101 @@
               <a:t> </a:t>
             </a:r>
             <a:r>
+              <a:rPr lang="en-US" b="0" dirty="0">
+                <a:solidFill>
+                  <a:srgbClr val="569CD6"/>
+                </a:solidFill>
+                <a:effectLst/>
+                <a:latin typeface="Consolas" panose="020B0609020204030204" pitchFamily="49" charset="0"/>
+              </a:rPr>
+              <a:t>this</a:t>
+            </a:r>
+            <a:r>
+              <a:rPr lang="en-US" b="0" dirty="0">
+                <a:effectLst/>
+                <a:latin typeface="Consolas" panose="020B0609020204030204" pitchFamily="49" charset="0"/>
+              </a:rPr>
+              <a:t>._</a:t>
+            </a:r>
+            <a:r>
               <a:rPr lang="en-US" b="0" dirty="0" err="1">
                 <a:effectLst/>
                 <a:latin typeface="Consolas" panose="020B0609020204030204" pitchFamily="49" charset="0"/>
               </a:rPr>
-              <a:t>IEnumerable</a:t>
+              <a:t>sequences.SelectMany</a:t>
             </a:r>
             <a:r>
               <a:rPr lang="en-US" b="0" dirty="0">
                 <a:effectLst/>
                 <a:latin typeface="Consolas" panose="020B0609020204030204" pitchFamily="49" charset="0"/>
               </a:rPr>
-              <a:t>&lt;Type&gt; </a:t>
+              <a:t>(item =&gt; item).</a:t>
             </a:r>
             <a:r>
               <a:rPr lang="en-US" b="0" dirty="0" err="1">
                 <a:effectLst/>
                 <a:latin typeface="Consolas" panose="020B0609020204030204" pitchFamily="49" charset="0"/>
               </a:rPr>
-              <a:t>GetShapes</a:t>
+              <a:t>ToList</a:t>
             </a:r>
             <a:r>
               <a:rPr lang="en-US" b="0" dirty="0">
                 <a:effectLst/>
                 <a:latin typeface="Consolas" panose="020B0609020204030204" pitchFamily="49" charset="0"/>
               </a:rPr>
-              <a:t>() =&gt; </a:t>
-            </a:r>
-            <a:r>
-              <a:rPr lang="en-US" b="0" dirty="0" err="1">
-                <a:effectLst/>
-                <a:latin typeface="Consolas" panose="020B0609020204030204" pitchFamily="49" charset="0"/>
-              </a:rPr>
-              <a:t>AppDomain.CurrentDomain.GetAssemblies</a:t>
-            </a:r>
+              <a:t>();</a:t>
+            </a:r>
+          </a:p>
+          <a:p>
+            <a:pPr marL="274320" lvl="1" indent="0">
+              <a:buNone/>
+            </a:pPr>
             <a:r>
               <a:rPr lang="en-US" b="0" dirty="0">
                 <a:effectLst/>
                 <a:latin typeface="Consolas" panose="020B0609020204030204" pitchFamily="49" charset="0"/>
               </a:rPr>
-              <a:t>().</a:t>
-            </a:r>
-            <a:r>
-              <a:rPr lang="en-US" b="0" dirty="0" err="1">
-                <a:effectLst/>
-                <a:latin typeface="Consolas" panose="020B0609020204030204" pitchFamily="49" charset="0"/>
-              </a:rPr>
-              <a:t>SelectMany</a:t>
-            </a:r>
+              <a:t>}</a:t>
+            </a:r>
+          </a:p>
+          <a:p>
+            <a:pPr marL="0" indent="0">
+              <a:buNone/>
+            </a:pPr>
             <a:r>
               <a:rPr lang="en-US" b="0" dirty="0">
                 <a:effectLst/>
                 <a:latin typeface="Consolas" panose="020B0609020204030204" pitchFamily="49" charset="0"/>
               </a:rPr>
-              <a:t>(item =&gt; </a:t>
-            </a:r>
-            <a:r>
-              <a:rPr lang="en-US" b="0" dirty="0" err="1">
-                <a:effectLst/>
-                <a:latin typeface="Consolas" panose="020B0609020204030204" pitchFamily="49" charset="0"/>
-              </a:rPr>
-              <a:t>item.GetTypes</a:t>
-            </a:r>
-            <a:r>
-              <a:rPr lang="en-US" b="0" dirty="0">
-                <a:effectLst/>
-                <a:latin typeface="Consolas" panose="020B0609020204030204" pitchFamily="49" charset="0"/>
-              </a:rPr>
-              <a:t>().Where(type =&gt; </a:t>
-            </a:r>
-            <a:r>
-              <a:rPr lang="en-US" b="0" dirty="0" err="1">
-                <a:effectLst/>
-                <a:latin typeface="Consolas" panose="020B0609020204030204" pitchFamily="49" charset="0"/>
-              </a:rPr>
-              <a:t>type.IsSubclassOf</a:t>
-            </a:r>
-            <a:r>
-              <a:rPr lang="en-US" b="0" dirty="0">
-                <a:effectLst/>
-                <a:latin typeface="Consolas" panose="020B0609020204030204" pitchFamily="49" charset="0"/>
-              </a:rPr>
-              <a:t>(</a:t>
-            </a:r>
-            <a:r>
-              <a:rPr lang="en-US" b="0" dirty="0" err="1">
-                <a:solidFill>
-                  <a:srgbClr val="569CD6"/>
-                </a:solidFill>
-                <a:effectLst/>
-                <a:latin typeface="Consolas" panose="020B0609020204030204" pitchFamily="49" charset="0"/>
-              </a:rPr>
-              <a:t>typeof</a:t>
-            </a:r>
-            <a:r>
-              <a:rPr lang="en-US" b="0" dirty="0">
-                <a:effectLst/>
-                <a:latin typeface="Consolas" panose="020B0609020204030204" pitchFamily="49" charset="0"/>
-              </a:rPr>
-              <a:t>(Shape))));</a:t>
-            </a:r>
+              <a:t>}</a:t>
+            </a:r>
+          </a:p>
+          <a:p>
+            <a:r>
+              <a:rPr lang="en-US" sz="1800" dirty="0"/>
+              <a:t>MSDN Documentation on enumerators</a:t>
+            </a:r>
+            <a:r>
+              <a:rPr lang="en-US" dirty="0"/>
+              <a:t>: </a:t>
+            </a:r>
+            <a:r>
+              <a:rPr lang="en-US" dirty="0">
+                <a:hlinkClick r:id="rId2"/>
+              </a:rPr>
+              <a:t>https://docs.microsoft.com/en-us/dotnet/api/system.collections.ienumerator</a:t>
+            </a:r>
+            <a:endParaRPr lang="en-US" b="0" dirty="0">
+              <a:effectLst/>
+              <a:latin typeface="Consolas" panose="020B0609020204030204" pitchFamily="49" charset="0"/>
+            </a:endParaRPr>
           </a:p>
         </p:txBody>
       </p:sp>
     </p:spTree>
     <p:extLst>
       <p:ext uri="{BB962C8B-B14F-4D97-AF65-F5344CB8AC3E}">
-        <p14:creationId xmlns:p14="http://schemas.microsoft.com/office/powerpoint/2010/main" val="2901066272"/>
+        <p14:creationId xmlns:p14="http://schemas.microsoft.com/office/powerpoint/2010/main" val="1197133609"/>
       </p:ext>
     </p:extLst>
   </p:cSld>
@@ -7062,6 +7508,15 @@
           <a:lstStyle/>
           <a:p>
             <a:r>
+              <a:rPr lang="en-US" dirty="0"/>
+              <a:t>We can further use those keys words and enumerators to simplify methods significantly</a:t>
+            </a:r>
+          </a:p>
+          <a:p>
+            <a:pPr marL="0" indent="0">
+              <a:buNone/>
+            </a:pPr>
+            <a:r>
               <a:rPr lang="en-US" b="0" dirty="0">
                 <a:solidFill>
                   <a:srgbClr val="569CD6"/>
@@ -7069,6 +7524,157 @@
                 <a:effectLst/>
                 <a:latin typeface="Consolas" panose="020B0609020204030204" pitchFamily="49" charset="0"/>
               </a:rPr>
+              <a:t>private</a:t>
+            </a:r>
+            <a:r>
+              <a:rPr lang="en-US" b="0" dirty="0">
+                <a:solidFill>
+                  <a:srgbClr val="CCCCCC"/>
+                </a:solidFill>
+                <a:effectLst/>
+                <a:latin typeface="Consolas" panose="020B0609020204030204" pitchFamily="49" charset="0"/>
+              </a:rPr>
+              <a:t> </a:t>
+            </a:r>
+            <a:r>
+              <a:rPr lang="en-US" b="0" dirty="0">
+                <a:solidFill>
+                  <a:srgbClr val="569CD6"/>
+                </a:solidFill>
+                <a:effectLst/>
+                <a:latin typeface="Consolas" panose="020B0609020204030204" pitchFamily="49" charset="0"/>
+              </a:rPr>
+              <a:t>static</a:t>
+            </a:r>
+            <a:r>
+              <a:rPr lang="en-US" b="0" dirty="0">
+                <a:solidFill>
+                  <a:srgbClr val="CCCCCC"/>
+                </a:solidFill>
+                <a:effectLst/>
+                <a:latin typeface="Consolas" panose="020B0609020204030204" pitchFamily="49" charset="0"/>
+              </a:rPr>
+              <a:t> </a:t>
+            </a:r>
+            <a:r>
+              <a:rPr lang="en-US" b="0" dirty="0" err="1">
+                <a:effectLst/>
+                <a:latin typeface="Consolas" panose="020B0609020204030204" pitchFamily="49" charset="0"/>
+              </a:rPr>
+              <a:t>IEnumerable</a:t>
+            </a:r>
+            <a:r>
+              <a:rPr lang="en-US" b="0" dirty="0">
+                <a:effectLst/>
+                <a:latin typeface="Consolas" panose="020B0609020204030204" pitchFamily="49" charset="0"/>
+              </a:rPr>
+              <a:t>&lt;Type&gt; </a:t>
+            </a:r>
+            <a:r>
+              <a:rPr lang="en-US" b="0" dirty="0" err="1">
+                <a:effectLst/>
+                <a:latin typeface="Consolas" panose="020B0609020204030204" pitchFamily="49" charset="0"/>
+              </a:rPr>
+              <a:t>GetShapes</a:t>
+            </a:r>
+            <a:r>
+              <a:rPr lang="en-US" b="0" dirty="0">
+                <a:effectLst/>
+                <a:latin typeface="Consolas" panose="020B0609020204030204" pitchFamily="49" charset="0"/>
+              </a:rPr>
+              <a:t>() =&gt; </a:t>
+            </a:r>
+            <a:r>
+              <a:rPr lang="en-US" b="0" dirty="0" err="1">
+                <a:effectLst/>
+                <a:latin typeface="Consolas" panose="020B0609020204030204" pitchFamily="49" charset="0"/>
+              </a:rPr>
+              <a:t>AppDomain.CurrentDomain.GetAssemblies</a:t>
+            </a:r>
+            <a:r>
+              <a:rPr lang="en-US" b="0" dirty="0">
+                <a:effectLst/>
+                <a:latin typeface="Consolas" panose="020B0609020204030204" pitchFamily="49" charset="0"/>
+              </a:rPr>
+              <a:t>().</a:t>
+            </a:r>
+            <a:r>
+              <a:rPr lang="en-US" b="0" dirty="0" err="1">
+                <a:effectLst/>
+                <a:latin typeface="Consolas" panose="020B0609020204030204" pitchFamily="49" charset="0"/>
+              </a:rPr>
+              <a:t>SelectMany</a:t>
+            </a:r>
+            <a:r>
+              <a:rPr lang="en-US" b="0" dirty="0">
+                <a:effectLst/>
+                <a:latin typeface="Consolas" panose="020B0609020204030204" pitchFamily="49" charset="0"/>
+              </a:rPr>
+              <a:t>(item =&gt; </a:t>
+            </a:r>
+            <a:r>
+              <a:rPr lang="en-US" b="0" dirty="0" err="1">
+                <a:effectLst/>
+                <a:latin typeface="Consolas" panose="020B0609020204030204" pitchFamily="49" charset="0"/>
+              </a:rPr>
+              <a:t>item.GetTypes</a:t>
+            </a:r>
+            <a:r>
+              <a:rPr lang="en-US" b="0" dirty="0">
+                <a:effectLst/>
+                <a:latin typeface="Consolas" panose="020B0609020204030204" pitchFamily="49" charset="0"/>
+              </a:rPr>
+              <a:t>().Where(type =&gt; </a:t>
+            </a:r>
+            <a:r>
+              <a:rPr lang="en-US" b="0" dirty="0" err="1">
+                <a:effectLst/>
+                <a:latin typeface="Consolas" panose="020B0609020204030204" pitchFamily="49" charset="0"/>
+              </a:rPr>
+              <a:t>type.IsSubclassOf</a:t>
+            </a:r>
+            <a:r>
+              <a:rPr lang="en-US" b="0" dirty="0">
+                <a:effectLst/>
+                <a:latin typeface="Consolas" panose="020B0609020204030204" pitchFamily="49" charset="0"/>
+              </a:rPr>
+              <a:t>(</a:t>
+            </a:r>
+            <a:r>
+              <a:rPr lang="en-US" b="0" dirty="0" err="1">
+                <a:solidFill>
+                  <a:srgbClr val="569CD6"/>
+                </a:solidFill>
+                <a:effectLst/>
+                <a:latin typeface="Consolas" panose="020B0609020204030204" pitchFamily="49" charset="0"/>
+              </a:rPr>
+              <a:t>typeof</a:t>
+            </a:r>
+            <a:r>
+              <a:rPr lang="en-US" b="0" dirty="0">
+                <a:effectLst/>
+                <a:latin typeface="Consolas" panose="020B0609020204030204" pitchFamily="49" charset="0"/>
+              </a:rPr>
+              <a:t>(Shape))));</a:t>
+            </a:r>
+          </a:p>
+          <a:p>
+            <a:endParaRPr lang="en-US" dirty="0">
+              <a:latin typeface="Consolas" panose="020B0609020204030204" pitchFamily="49" charset="0"/>
+            </a:endParaRPr>
+          </a:p>
+          <a:p>
+            <a:pPr marL="0" indent="0">
+              <a:buNone/>
+            </a:pPr>
+            <a:r>
+              <a:rPr lang="en-US" b="0" dirty="0">
+                <a:solidFill>
+                  <a:srgbClr val="569CD6"/>
+                </a:solidFill>
+                <a:effectLst/>
+                <a:latin typeface="Consolas" panose="020B0609020204030204" pitchFamily="49" charset="0"/>
+              </a:rPr>
               <a:t>public</a:t>
             </a:r>
             <a:r>
@@ -7204,14 +7810,20 @@
             </a:r>
           </a:p>
           <a:p>
-            <a:endParaRPr lang="en-US" dirty="0"/>
+            <a:pPr marL="0" indent="0">
+              <a:buNone/>
+            </a:pPr>
+            <a:endParaRPr lang="en-US" b="0" dirty="0">
+              <a:effectLst/>
+              <a:latin typeface="Consolas" panose="020B0609020204030204" pitchFamily="49" charset="0"/>
+            </a:endParaRPr>
           </a:p>
         </p:txBody>
       </p:sp>
     </p:spTree>
     <p:extLst>
       <p:ext uri="{BB962C8B-B14F-4D97-AF65-F5344CB8AC3E}">
-        <p14:creationId xmlns:p14="http://schemas.microsoft.com/office/powerpoint/2010/main" val="2191981442"/>
+        <p14:creationId xmlns:p14="http://schemas.microsoft.com/office/powerpoint/2010/main" val="2901066272"/>
       </p:ext>
     </p:extLst>
   </p:cSld>
@@ -7688,7 +8300,9 @@
             <a:r>
               <a:rPr lang="en-US" b="1" dirty="0" err="1">
                 <a:solidFill>
-                  <a:srgbClr val="9CDCFE"/>
+                  <a:schemeClr val="accent2">
+                    <a:lumMod val="75000"/>
+                  </a:schemeClr>
                 </a:solidFill>
                 <a:latin typeface="Consolas" panose="020B0609020204030204" pitchFamily="49" charset="0"/>
               </a:rPr>
@@ -7730,7 +8344,9 @@
             <a:r>
               <a:rPr lang="en-US" b="1" dirty="0">
                 <a:solidFill>
-                  <a:srgbClr val="9CDCFE"/>
+                  <a:schemeClr val="accent2">
+                    <a:lumMod val="75000"/>
+                  </a:schemeClr>
                 </a:solidFill>
                 <a:latin typeface="Consolas" panose="020B0609020204030204" pitchFamily="49" charset="0"/>
               </a:rPr>
@@ -7754,7 +8370,9 @@
             <a:r>
               <a:rPr lang="en-US" b="1" dirty="0">
                 <a:solidFill>
-                  <a:srgbClr val="9CDCFE"/>
+                  <a:schemeClr val="accent2">
+                    <a:lumMod val="75000"/>
+                  </a:schemeClr>
                 </a:solidFill>
                 <a:latin typeface="Consolas" panose="020B0609020204030204" pitchFamily="49" charset="0"/>
               </a:rPr>
@@ -7789,7 +8407,9 @@
             <a:r>
               <a:rPr lang="en-US" b="1" dirty="0" err="1">
                 <a:solidFill>
-                  <a:srgbClr val="9CDCFE"/>
+                  <a:schemeClr val="accent2">
+                    <a:lumMod val="75000"/>
+                  </a:schemeClr>
                 </a:solidFill>
                 <a:latin typeface="Consolas" panose="020B0609020204030204" pitchFamily="49" charset="0"/>
               </a:rPr>
@@ -7822,7 +8442,9 @@
             <a:r>
               <a:rPr lang="en-US" b="1" dirty="0">
                 <a:solidFill>
-                  <a:srgbClr val="9CDCFE"/>
+                  <a:schemeClr val="accent2">
+                    <a:lumMod val="75000"/>
+                  </a:schemeClr>
                 </a:solidFill>
                 <a:latin typeface="Consolas" panose="020B0609020204030204" pitchFamily="49" charset="0"/>
               </a:rPr>
@@ -7860,7 +8482,9 @@
             <a:r>
               <a:rPr lang="en-US" b="1" dirty="0">
                 <a:solidFill>
-                  <a:srgbClr val="9CDCFE"/>
+                  <a:schemeClr val="accent2">
+                    <a:lumMod val="75000"/>
+                  </a:schemeClr>
                 </a:solidFill>
                 <a:latin typeface="Consolas" panose="020B0609020204030204" pitchFamily="49" charset="0"/>
               </a:rPr>
@@ -7902,7 +8526,9 @@
             <a:r>
               <a:rPr lang="en-US" b="1" dirty="0" err="1">
                 <a:solidFill>
-                  <a:srgbClr val="9CDCFE"/>
+                  <a:schemeClr val="accent2">
+                    <a:lumMod val="75000"/>
+                  </a:schemeClr>
                 </a:solidFill>
                 <a:latin typeface="Consolas" panose="020B0609020204030204" pitchFamily="49" charset="0"/>
               </a:rPr>
@@ -7931,7 +8557,9 @@
             <a:r>
               <a:rPr lang="en-US" b="1" dirty="0">
                 <a:solidFill>
-                  <a:srgbClr val="9CDCFE"/>
+                  <a:schemeClr val="accent2">
+                    <a:lumMod val="75000"/>
+                  </a:schemeClr>
                 </a:solidFill>
                 <a:latin typeface="Consolas" panose="020B0609020204030204" pitchFamily="49" charset="0"/>
               </a:rPr>
@@ -7946,7 +8574,9 @@
             <a:r>
               <a:rPr lang="en-US" b="1" dirty="0" err="1">
                 <a:solidFill>
-                  <a:srgbClr val="9CDCFE"/>
+                  <a:schemeClr val="accent2">
+                    <a:lumMod val="75000"/>
+                  </a:schemeClr>
                 </a:solidFill>
                 <a:latin typeface="Consolas" panose="020B0609020204030204" pitchFamily="49" charset="0"/>
               </a:rPr>
@@ -7976,7 +8606,9 @@
             <a:r>
               <a:rPr lang="en-US" b="1" dirty="0" err="1">
                 <a:solidFill>
-                  <a:srgbClr val="9CDCFE"/>
+                  <a:schemeClr val="accent2">
+                    <a:lumMod val="75000"/>
+                  </a:schemeClr>
                 </a:solidFill>
                 <a:latin typeface="Consolas" panose="020B0609020204030204" pitchFamily="49" charset="0"/>
               </a:rPr>
@@ -8006,7 +8638,22 @@
               <a:rPr lang="en-US" b="1" dirty="0">
                 <a:latin typeface="Consolas" panose="020B0609020204030204" pitchFamily="49" charset="0"/>
               </a:rPr>
-              <a:t>        $"",</a:t>
+              <a:t>        </a:t>
+            </a:r>
+            <a:r>
+              <a:rPr lang="en-US" b="1" dirty="0">
+                <a:solidFill>
+                  <a:srgbClr val="CE9178"/>
+                </a:solidFill>
+                <a:latin typeface="Consolas" panose="020B0609020204030204" pitchFamily="49" charset="0"/>
+              </a:rPr>
+              <a:t>$""</a:t>
+            </a:r>
+            <a:r>
+              <a:rPr lang="en-US" b="1" dirty="0">
+                <a:latin typeface="Consolas" panose="020B0609020204030204" pitchFamily="49" charset="0"/>
+              </a:rPr>
+              <a:t>,</a:t>
             </a:r>
           </a:p>
           <a:p>
@@ -8037,7 +8684,9 @@
             <a:r>
               <a:rPr lang="en-US" b="1" dirty="0" err="1">
                 <a:solidFill>
-                  <a:srgbClr val="9CDCFE"/>
+                  <a:schemeClr val="accent2">
+                    <a:lumMod val="75000"/>
+                  </a:schemeClr>
                 </a:solidFill>
                 <a:latin typeface="Consolas" panose="020B0609020204030204" pitchFamily="49" charset="0"/>
               </a:rPr>
@@ -8093,7 +8742,9 @@
             <a:r>
               <a:rPr lang="en-US" b="1" dirty="0" err="1">
                 <a:solidFill>
-                  <a:srgbClr val="9CDCFE"/>
+                  <a:schemeClr val="accent2">
+                    <a:lumMod val="75000"/>
+                  </a:schemeClr>
                 </a:solidFill>
                 <a:latin typeface="Consolas" panose="020B0609020204030204" pitchFamily="49" charset="0"/>
               </a:rPr>
@@ -8177,7 +8828,9 @@
             <a:r>
               <a:rPr lang="en-US" b="1" dirty="0">
                 <a:solidFill>
-                  <a:srgbClr val="9CDCFE"/>
+                  <a:schemeClr val="accent2">
+                    <a:lumMod val="75000"/>
+                  </a:schemeClr>
                 </a:solidFill>
                 <a:latin typeface="Consolas" panose="020B0609020204030204" pitchFamily="49" charset="0"/>
               </a:rPr>
@@ -8307,7 +8960,7 @@
           <a:p>
             <a:r>
               <a:rPr lang="en-US" sz="2000" dirty="0"/>
-              <a:t>Often developers assume that reference types (accept non-null and null both and there wasn't any explicit handling required and unfortunately this consideration is one of the primary root causes of famous "Null Reference Exception".</a:t>
+              <a:t>Often developers assume that reference types accept non-null and null both and there wasn't any explicit handling required and unfortunately this consideration is one of the primary root causes of famous "Null Reference Exception".</a:t>
             </a:r>
           </a:p>
           <a:p>
@@ -8884,9 +9537,65 @@
               </a:rPr>
               <a:t>It means quite as it sounds, allowing a reference type such as </a:t>
             </a:r>
-          </a:p>
-          <a:p>
-            <a:endParaRPr lang="en-US" sz="2000" kern="1200" dirty="0">
+            <a:r>
+              <a:rPr lang="en-US" b="0" i="0" dirty="0">
+                <a:solidFill>
+                  <a:srgbClr val="0101FD"/>
+                </a:solidFill>
+                <a:effectLst/>
+                <a:latin typeface="SFMono-Regular"/>
+              </a:rPr>
+              <a:t>string</a:t>
+            </a:r>
+            <a:r>
+              <a:rPr lang="en-US" b="0" i="0" dirty="0">
+                <a:solidFill>
+                  <a:srgbClr val="171717"/>
+                </a:solidFill>
+                <a:effectLst/>
+                <a:latin typeface="SFMono-Regular"/>
+              </a:rPr>
+              <a:t> name; </a:t>
+            </a:r>
+            <a:r>
+              <a:rPr lang="en-US" b="0" i="0" dirty="0">
+                <a:solidFill>
+                  <a:srgbClr val="000000"/>
+                </a:solidFill>
+                <a:latin typeface="Garamond" panose="02020404030301010803" pitchFamily="18" charset="0"/>
+              </a:rPr>
+              <a:t>to contain a null </a:t>
+            </a:r>
+            <a:r>
+              <a:rPr lang="en-US" dirty="0">
+                <a:solidFill>
+                  <a:srgbClr val="000000"/>
+                </a:solidFill>
+                <a:latin typeface="Garamond" panose="02020404030301010803" pitchFamily="18" charset="0"/>
+              </a:rPr>
+              <a:t>value such as </a:t>
+            </a:r>
+            <a:r>
+              <a:rPr lang="en-US" b="0" i="0" dirty="0">
+                <a:solidFill>
+                  <a:srgbClr val="0101FD"/>
+                </a:solidFill>
+                <a:effectLst/>
+                <a:latin typeface="SFMono-Regular"/>
+              </a:rPr>
+              <a:t>string</a:t>
+            </a:r>
+            <a:r>
+              <a:rPr lang="en-US" b="0" i="0" dirty="0">
+                <a:solidFill>
+                  <a:srgbClr val="171717"/>
+                </a:solidFill>
+                <a:effectLst/>
+                <a:latin typeface="SFMono-Regular"/>
+              </a:rPr>
+              <a:t> name = null;</a:t>
+            </a:r>
+            <a:endParaRPr lang="en-US" kern="1200" dirty="0">
               <a:solidFill>
                 <a:srgbClr val="000000"/>
               </a:solidFill>
@@ -8897,6 +9606,17 @@
             </a:endParaRPr>
           </a:p>
           <a:p>
+            <a:endParaRPr lang="en-US" sz="2000" dirty="0">
+              <a:solidFill>
+                <a:srgbClr val="000000"/>
+              </a:solidFill>
+              <a:latin typeface="Garamond" panose="02020404030301010803" pitchFamily="18" charset="0"/>
+            </a:endParaRPr>
+          </a:p>
+          <a:p>
+            <a:pPr marL="0" indent="0">
+              <a:buNone/>
+            </a:pPr>
             <a:endParaRPr lang="en-US" sz="2000" dirty="0">
               <a:solidFill>
                 <a:srgbClr val="000000"/>

</xml_diff>